<commit_message>
Eine Folie der PPP ergänzt
Former-commit-id: f3c6ed0d2b3f537dfed5366bf12103e92fe130f6
</commit_message>
<xml_diff>
--- a/documents/Meilensteine/Meilenstein III/Meilenstein_3_Präsentation .pptx
+++ b/documents/Meilensteine/Meilenstein III/Meilenstein_3_Präsentation .pptx
@@ -3493,7 +3493,7 @@
           <a:noFill/>
           <a:extLst>
             <a:ext uri="{909E8E84-426E-40dd-AFC4-6F175D3DCCD1}">
-              <a14:hiddenFill xmlns:a14="http://schemas.microsoft.com/office/drawing/2010/main" xmlns="">
+              <a14:hiddenFill xmlns="" xmlns:a14="http://schemas.microsoft.com/office/drawing/2010/main">
                 <a:solidFill>
                   <a:srgbClr val="FFFFFF"/>
                 </a:solidFill>
@@ -3553,7 +3553,7 @@
             </a:ln>
             <a:extLst>
               <a:ext uri="{91240B29-F687-4f45-9708-019B960494DF}">
-                <a14:hiddenLine xmlns:a14="http://schemas.microsoft.com/office/drawing/2010/main" xmlns="" w="9525">
+                <a14:hiddenLine xmlns="" xmlns:a14="http://schemas.microsoft.com/office/drawing/2010/main" w="9525">
                   <a:solidFill>
                     <a:srgbClr val="000000"/>
                   </a:solidFill>
@@ -3643,7 +3643,7 @@
             </a:ln>
             <a:extLst>
               <a:ext uri="{91240B29-F687-4f45-9708-019B960494DF}">
-                <a14:hiddenLine xmlns:a14="http://schemas.microsoft.com/office/drawing/2010/main" xmlns="" w="9525">
+                <a14:hiddenLine xmlns="" xmlns:a14="http://schemas.microsoft.com/office/drawing/2010/main" w="9525">
                   <a:solidFill>
                     <a:srgbClr val="000000"/>
                   </a:solidFill>
@@ -3733,7 +3733,7 @@
             </a:ln>
             <a:extLst>
               <a:ext uri="{91240B29-F687-4f45-9708-019B960494DF}">
-                <a14:hiddenLine xmlns:a14="http://schemas.microsoft.com/office/drawing/2010/main" xmlns="" w="9525">
+                <a14:hiddenLine xmlns="" xmlns:a14="http://schemas.microsoft.com/office/drawing/2010/main" w="9525">
                   <a:solidFill>
                     <a:srgbClr val="000000"/>
                   </a:solidFill>
@@ -3767,7 +3767,7 @@
             </a:ln>
             <a:extLst>
               <a:ext uri="{91240B29-F687-4f45-9708-019B960494DF}">
-                <a14:hiddenLine xmlns:a14="http://schemas.microsoft.com/office/drawing/2010/main" xmlns="" w="9525">
+                <a14:hiddenLine xmlns="" xmlns:a14="http://schemas.microsoft.com/office/drawing/2010/main" w="9525">
                   <a:solidFill>
                     <a:srgbClr val="000000"/>
                   </a:solidFill>
@@ -3857,7 +3857,7 @@
             </a:ln>
             <a:extLst>
               <a:ext uri="{91240B29-F687-4f45-9708-019B960494DF}">
-                <a14:hiddenLine xmlns:a14="http://schemas.microsoft.com/office/drawing/2010/main" xmlns="" w="9525">
+                <a14:hiddenLine xmlns="" xmlns:a14="http://schemas.microsoft.com/office/drawing/2010/main" w="9525">
                   <a:solidFill>
                     <a:srgbClr val="000000"/>
                   </a:solidFill>
@@ -3919,7 +3919,7 @@
             </a:ln>
             <a:extLst>
               <a:ext uri="{91240B29-F687-4f45-9708-019B960494DF}">
-                <a14:hiddenLine xmlns:a14="http://schemas.microsoft.com/office/drawing/2010/main" xmlns="" w="9525">
+                <a14:hiddenLine xmlns="" xmlns:a14="http://schemas.microsoft.com/office/drawing/2010/main" w="9525">
                   <a:solidFill>
                     <a:srgbClr val="000000"/>
                   </a:solidFill>
@@ -3981,7 +3981,7 @@
             </a:ln>
             <a:extLst>
               <a:ext uri="{91240B29-F687-4f45-9708-019B960494DF}">
-                <a14:hiddenLine xmlns:a14="http://schemas.microsoft.com/office/drawing/2010/main" xmlns="" w="9525">
+                <a14:hiddenLine xmlns="" xmlns:a14="http://schemas.microsoft.com/office/drawing/2010/main" w="9525">
                   <a:solidFill>
                     <a:srgbClr val="000000"/>
                   </a:solidFill>
@@ -4071,7 +4071,7 @@
             </a:ln>
             <a:extLst>
               <a:ext uri="{91240B29-F687-4f45-9708-019B960494DF}">
-                <a14:hiddenLine xmlns:a14="http://schemas.microsoft.com/office/drawing/2010/main" xmlns="" w="9525">
+                <a14:hiddenLine xmlns="" xmlns:a14="http://schemas.microsoft.com/office/drawing/2010/main" w="9525">
                   <a:solidFill>
                     <a:srgbClr val="000000"/>
                   </a:solidFill>
@@ -4133,7 +4133,7 @@
             </a:ln>
             <a:extLst>
               <a:ext uri="{91240B29-F687-4f45-9708-019B960494DF}">
-                <a14:hiddenLine xmlns:a14="http://schemas.microsoft.com/office/drawing/2010/main" xmlns="" w="9525">
+                <a14:hiddenLine xmlns="" xmlns:a14="http://schemas.microsoft.com/office/drawing/2010/main" w="9525">
                   <a:solidFill>
                     <a:srgbClr val="000000"/>
                   </a:solidFill>
@@ -4195,7 +4195,7 @@
             </a:ln>
             <a:extLst>
               <a:ext uri="{91240B29-F687-4f45-9708-019B960494DF}">
-                <a14:hiddenLine xmlns:a14="http://schemas.microsoft.com/office/drawing/2010/main" xmlns="" w="9525">
+                <a14:hiddenLine xmlns="" xmlns:a14="http://schemas.microsoft.com/office/drawing/2010/main" w="9525">
                   <a:solidFill>
                     <a:srgbClr val="000000"/>
                   </a:solidFill>
@@ -4285,7 +4285,7 @@
             </a:ln>
             <a:extLst>
               <a:ext uri="{91240B29-F687-4f45-9708-019B960494DF}">
-                <a14:hiddenLine xmlns:a14="http://schemas.microsoft.com/office/drawing/2010/main" xmlns="" w="9525">
+                <a14:hiddenLine xmlns="" xmlns:a14="http://schemas.microsoft.com/office/drawing/2010/main" w="9525">
                   <a:solidFill>
                     <a:srgbClr val="000000"/>
                   </a:solidFill>
@@ -4375,7 +4375,7 @@
             </a:ln>
             <a:extLst>
               <a:ext uri="{91240B29-F687-4f45-9708-019B960494DF}">
-                <a14:hiddenLine xmlns:a14="http://schemas.microsoft.com/office/drawing/2010/main" xmlns="" w="9525">
+                <a14:hiddenLine xmlns="" xmlns:a14="http://schemas.microsoft.com/office/drawing/2010/main" w="9525">
                   <a:solidFill>
                     <a:srgbClr val="000000"/>
                   </a:solidFill>
@@ -4437,7 +4437,7 @@
             </a:ln>
             <a:extLst>
               <a:ext uri="{91240B29-F687-4f45-9708-019B960494DF}">
-                <a14:hiddenLine xmlns:a14="http://schemas.microsoft.com/office/drawing/2010/main" xmlns="" w="9525">
+                <a14:hiddenLine xmlns="" xmlns:a14="http://schemas.microsoft.com/office/drawing/2010/main" w="9525">
                   <a:solidFill>
                     <a:srgbClr val="000000"/>
                   </a:solidFill>
@@ -4547,7 +4547,7 @@
             </a:ln>
             <a:extLst>
               <a:ext uri="{91240B29-F687-4f45-9708-019B960494DF}">
-                <a14:hiddenLine xmlns:a14="http://schemas.microsoft.com/office/drawing/2010/main" xmlns="" w="9525">
+                <a14:hiddenLine xmlns="" xmlns:a14="http://schemas.microsoft.com/office/drawing/2010/main" w="9525">
                   <a:solidFill>
                     <a:srgbClr val="000000"/>
                   </a:solidFill>
@@ -4609,7 +4609,7 @@
             </a:ln>
             <a:extLst>
               <a:ext uri="{91240B29-F687-4f45-9708-019B960494DF}">
-                <a14:hiddenLine xmlns:a14="http://schemas.microsoft.com/office/drawing/2010/main" xmlns="" w="9525">
+                <a14:hiddenLine xmlns="" xmlns:a14="http://schemas.microsoft.com/office/drawing/2010/main" w="9525">
                   <a:solidFill>
                     <a:srgbClr val="000000"/>
                   </a:solidFill>
@@ -4699,7 +4699,7 @@
             </a:ln>
             <a:extLst>
               <a:ext uri="{91240B29-F687-4f45-9708-019B960494DF}">
-                <a14:hiddenLine xmlns:a14="http://schemas.microsoft.com/office/drawing/2010/main" xmlns="" w="9525">
+                <a14:hiddenLine xmlns="" xmlns:a14="http://schemas.microsoft.com/office/drawing/2010/main" w="9525">
                   <a:solidFill>
                     <a:srgbClr val="000000"/>
                   </a:solidFill>
@@ -4789,7 +4789,7 @@
             </a:ln>
             <a:extLst>
               <a:ext uri="{91240B29-F687-4f45-9708-019B960494DF}">
-                <a14:hiddenLine xmlns:a14="http://schemas.microsoft.com/office/drawing/2010/main" xmlns="" w="9525">
+                <a14:hiddenLine xmlns="" xmlns:a14="http://schemas.microsoft.com/office/drawing/2010/main" w="9525">
                   <a:solidFill>
                     <a:srgbClr val="000000"/>
                   </a:solidFill>
@@ -4851,7 +4851,7 @@
             </a:ln>
             <a:extLst>
               <a:ext uri="{91240B29-F687-4f45-9708-019B960494DF}">
-                <a14:hiddenLine xmlns:a14="http://schemas.microsoft.com/office/drawing/2010/main" xmlns="" w="9525">
+                <a14:hiddenLine xmlns="" xmlns:a14="http://schemas.microsoft.com/office/drawing/2010/main" w="9525">
                   <a:solidFill>
                     <a:srgbClr val="000000"/>
                   </a:solidFill>
@@ -4941,7 +4941,7 @@
             </a:ln>
             <a:extLst>
               <a:ext uri="{91240B29-F687-4f45-9708-019B960494DF}">
-                <a14:hiddenLine xmlns:a14="http://schemas.microsoft.com/office/drawing/2010/main" xmlns="" w="9525">
+                <a14:hiddenLine xmlns="" xmlns:a14="http://schemas.microsoft.com/office/drawing/2010/main" w="9525">
                   <a:solidFill>
                     <a:srgbClr val="000000"/>
                   </a:solidFill>
@@ -5031,7 +5031,7 @@
             </a:ln>
             <a:extLst>
               <a:ext uri="{91240B29-F687-4f45-9708-019B960494DF}">
-                <a14:hiddenLine xmlns:a14="http://schemas.microsoft.com/office/drawing/2010/main" xmlns="" w="9525">
+                <a14:hiddenLine xmlns="" xmlns:a14="http://schemas.microsoft.com/office/drawing/2010/main" w="9525">
                   <a:solidFill>
                     <a:srgbClr val="000000"/>
                   </a:solidFill>
@@ -5087,7 +5087,7 @@
             </a:ln>
             <a:extLst>
               <a:ext uri="{91240B29-F687-4f45-9708-019B960494DF}">
-                <a14:hiddenLine xmlns:a14="http://schemas.microsoft.com/office/drawing/2010/main" xmlns="" w="9525">
+                <a14:hiddenLine xmlns="" xmlns:a14="http://schemas.microsoft.com/office/drawing/2010/main" w="9525">
                   <a:solidFill>
                     <a:srgbClr val="000000"/>
                   </a:solidFill>
@@ -5177,7 +5177,7 @@
             </a:ln>
             <a:extLst>
               <a:ext uri="{91240B29-F687-4f45-9708-019B960494DF}">
-                <a14:hiddenLine xmlns:a14="http://schemas.microsoft.com/office/drawing/2010/main" xmlns="" w="9525">
+                <a14:hiddenLine xmlns="" xmlns:a14="http://schemas.microsoft.com/office/drawing/2010/main" w="9525">
                   <a:solidFill>
                     <a:srgbClr val="000000"/>
                   </a:solidFill>
@@ -5233,7 +5233,7 @@
             </a:ln>
             <a:extLst>
               <a:ext uri="{91240B29-F687-4f45-9708-019B960494DF}">
-                <a14:hiddenLine xmlns:a14="http://schemas.microsoft.com/office/drawing/2010/main" xmlns="" w="9525">
+                <a14:hiddenLine xmlns="" xmlns:a14="http://schemas.microsoft.com/office/drawing/2010/main" w="9525">
                   <a:solidFill>
                     <a:srgbClr val="000000"/>
                   </a:solidFill>
@@ -5323,7 +5323,7 @@
             </a:ln>
             <a:extLst>
               <a:ext uri="{91240B29-F687-4f45-9708-019B960494DF}">
-                <a14:hiddenLine xmlns:a14="http://schemas.microsoft.com/office/drawing/2010/main" xmlns="" w="9525">
+                <a14:hiddenLine xmlns="" xmlns:a14="http://schemas.microsoft.com/office/drawing/2010/main" w="9525">
                   <a:solidFill>
                     <a:srgbClr val="000000"/>
                   </a:solidFill>
@@ -5391,7 +5391,7 @@
             </a:ln>
             <a:extLst>
               <a:ext uri="{91240B29-F687-4f45-9708-019B960494DF}">
-                <a14:hiddenLine xmlns:a14="http://schemas.microsoft.com/office/drawing/2010/main" xmlns="" w="9525">
+                <a14:hiddenLine xmlns="" xmlns:a14="http://schemas.microsoft.com/office/drawing/2010/main" w="9525">
                   <a:solidFill>
                     <a:srgbClr val="000000"/>
                   </a:solidFill>
@@ -5481,7 +5481,7 @@
             </a:ln>
             <a:extLst>
               <a:ext uri="{91240B29-F687-4f45-9708-019B960494DF}">
-                <a14:hiddenLine xmlns:a14="http://schemas.microsoft.com/office/drawing/2010/main" xmlns="" w="9525">
+                <a14:hiddenLine xmlns="" xmlns:a14="http://schemas.microsoft.com/office/drawing/2010/main" w="9525">
                   <a:solidFill>
                     <a:srgbClr val="000000"/>
                   </a:solidFill>
@@ -5549,7 +5549,7 @@
             </a:ln>
             <a:extLst>
               <a:ext uri="{91240B29-F687-4f45-9708-019B960494DF}">
-                <a14:hiddenLine xmlns:a14="http://schemas.microsoft.com/office/drawing/2010/main" xmlns="" w="9525">
+                <a14:hiddenLine xmlns="" xmlns:a14="http://schemas.microsoft.com/office/drawing/2010/main" w="9525">
                   <a:solidFill>
                     <a:srgbClr val="000000"/>
                   </a:solidFill>
@@ -5639,7 +5639,7 @@
             </a:ln>
             <a:extLst>
               <a:ext uri="{91240B29-F687-4f45-9708-019B960494DF}">
-                <a14:hiddenLine xmlns:a14="http://schemas.microsoft.com/office/drawing/2010/main" xmlns="" w="9525">
+                <a14:hiddenLine xmlns="" xmlns:a14="http://schemas.microsoft.com/office/drawing/2010/main" w="9525">
                   <a:solidFill>
                     <a:srgbClr val="000000"/>
                   </a:solidFill>
@@ -5673,7 +5673,7 @@
             </a:ln>
             <a:extLst>
               <a:ext uri="{91240B29-F687-4f45-9708-019B960494DF}">
-                <a14:hiddenLine xmlns:a14="http://schemas.microsoft.com/office/drawing/2010/main" xmlns="" w="9525">
+                <a14:hiddenLine xmlns="" xmlns:a14="http://schemas.microsoft.com/office/drawing/2010/main" w="9525">
                   <a:solidFill>
                     <a:srgbClr val="000000"/>
                   </a:solidFill>
@@ -5763,7 +5763,7 @@
             </a:ln>
             <a:extLst>
               <a:ext uri="{91240B29-F687-4f45-9708-019B960494DF}">
-                <a14:hiddenLine xmlns:a14="http://schemas.microsoft.com/office/drawing/2010/main" xmlns="" w="9525">
+                <a14:hiddenLine xmlns="" xmlns:a14="http://schemas.microsoft.com/office/drawing/2010/main" w="9525">
                   <a:solidFill>
                     <a:srgbClr val="000000"/>
                   </a:solidFill>
@@ -5825,7 +5825,7 @@
             </a:ln>
             <a:extLst>
               <a:ext uri="{91240B29-F687-4f45-9708-019B960494DF}">
-                <a14:hiddenLine xmlns:a14="http://schemas.microsoft.com/office/drawing/2010/main" xmlns="" w="9525">
+                <a14:hiddenLine xmlns="" xmlns:a14="http://schemas.microsoft.com/office/drawing/2010/main" w="9525">
                   <a:solidFill>
                     <a:srgbClr val="000000"/>
                   </a:solidFill>
@@ -5887,7 +5887,7 @@
             </a:ln>
             <a:extLst>
               <a:ext uri="{91240B29-F687-4f45-9708-019B960494DF}">
-                <a14:hiddenLine xmlns:a14="http://schemas.microsoft.com/office/drawing/2010/main" xmlns="" w="9525">
+                <a14:hiddenLine xmlns="" xmlns:a14="http://schemas.microsoft.com/office/drawing/2010/main" w="9525">
                   <a:solidFill>
                     <a:srgbClr val="000000"/>
                   </a:solidFill>
@@ -5977,7 +5977,7 @@
             </a:ln>
             <a:extLst>
               <a:ext uri="{91240B29-F687-4f45-9708-019B960494DF}">
-                <a14:hiddenLine xmlns:a14="http://schemas.microsoft.com/office/drawing/2010/main" xmlns="" w="9525">
+                <a14:hiddenLine xmlns="" xmlns:a14="http://schemas.microsoft.com/office/drawing/2010/main" w="9525">
                   <a:solidFill>
                     <a:srgbClr val="000000"/>
                   </a:solidFill>
@@ -6045,7 +6045,7 @@
             </a:ln>
             <a:extLst>
               <a:ext uri="{91240B29-F687-4f45-9708-019B960494DF}">
-                <a14:hiddenLine xmlns:a14="http://schemas.microsoft.com/office/drawing/2010/main" xmlns="" w="9525">
+                <a14:hiddenLine xmlns="" xmlns:a14="http://schemas.microsoft.com/office/drawing/2010/main" w="9525">
                   <a:solidFill>
                     <a:srgbClr val="000000"/>
                   </a:solidFill>
@@ -6107,7 +6107,7 @@
             </a:ln>
             <a:extLst>
               <a:ext uri="{91240B29-F687-4f45-9708-019B960494DF}">
-                <a14:hiddenLine xmlns:a14="http://schemas.microsoft.com/office/drawing/2010/main" xmlns="" w="9525">
+                <a14:hiddenLine xmlns="" xmlns:a14="http://schemas.microsoft.com/office/drawing/2010/main" w="9525">
                   <a:solidFill>
                     <a:srgbClr val="000000"/>
                   </a:solidFill>
@@ -6197,7 +6197,7 @@
             </a:ln>
             <a:extLst>
               <a:ext uri="{91240B29-F687-4f45-9708-019B960494DF}">
-                <a14:hiddenLine xmlns:a14="http://schemas.microsoft.com/office/drawing/2010/main" xmlns="" w="9525">
+                <a14:hiddenLine xmlns="" xmlns:a14="http://schemas.microsoft.com/office/drawing/2010/main" w="9525">
                   <a:solidFill>
                     <a:srgbClr val="000000"/>
                   </a:solidFill>
@@ -6259,7 +6259,7 @@
             </a:ln>
             <a:extLst>
               <a:ext uri="{91240B29-F687-4f45-9708-019B960494DF}">
-                <a14:hiddenLine xmlns:a14="http://schemas.microsoft.com/office/drawing/2010/main" xmlns="" w="9525">
+                <a14:hiddenLine xmlns="" xmlns:a14="http://schemas.microsoft.com/office/drawing/2010/main" w="9525">
                   <a:solidFill>
                     <a:srgbClr val="000000"/>
                   </a:solidFill>
@@ -6349,7 +6349,7 @@
             </a:ln>
             <a:extLst>
               <a:ext uri="{91240B29-F687-4f45-9708-019B960494DF}">
-                <a14:hiddenLine xmlns:a14="http://schemas.microsoft.com/office/drawing/2010/main" xmlns="" w="9525">
+                <a14:hiddenLine xmlns="" xmlns:a14="http://schemas.microsoft.com/office/drawing/2010/main" w="9525">
                   <a:solidFill>
                     <a:srgbClr val="000000"/>
                   </a:solidFill>
@@ -6411,7 +6411,7 @@
             </a:ln>
             <a:extLst>
               <a:ext uri="{91240B29-F687-4f45-9708-019B960494DF}">
-                <a14:hiddenLine xmlns:a14="http://schemas.microsoft.com/office/drawing/2010/main" xmlns="" w="9525">
+                <a14:hiddenLine xmlns="" xmlns:a14="http://schemas.microsoft.com/office/drawing/2010/main" w="9525">
                   <a:solidFill>
                     <a:srgbClr val="000000"/>
                   </a:solidFill>
@@ -6501,7 +6501,7 @@
             </a:ln>
             <a:extLst>
               <a:ext uri="{91240B29-F687-4f45-9708-019B960494DF}">
-                <a14:hiddenLine xmlns:a14="http://schemas.microsoft.com/office/drawing/2010/main" xmlns="" w="9525">
+                <a14:hiddenLine xmlns="" xmlns:a14="http://schemas.microsoft.com/office/drawing/2010/main" w="9525">
                   <a:solidFill>
                     <a:srgbClr val="000000"/>
                   </a:solidFill>
@@ -6535,7 +6535,7 @@
             </a:ln>
             <a:extLst>
               <a:ext uri="{91240B29-F687-4f45-9708-019B960494DF}">
-                <a14:hiddenLine xmlns:a14="http://schemas.microsoft.com/office/drawing/2010/main" xmlns="" w="9525">
+                <a14:hiddenLine xmlns="" xmlns:a14="http://schemas.microsoft.com/office/drawing/2010/main" w="9525">
                   <a:solidFill>
                     <a:srgbClr val="000000"/>
                   </a:solidFill>
@@ -6600,7 +6600,7 @@
             </a:ln>
             <a:extLst>
               <a:ext uri="{91240B29-F687-4f45-9708-019B960494DF}">
-                <a14:hiddenLine xmlns:a14="http://schemas.microsoft.com/office/drawing/2010/main" xmlns="" w="9525">
+                <a14:hiddenLine xmlns="" xmlns:a14="http://schemas.microsoft.com/office/drawing/2010/main" w="9525">
                   <a:solidFill>
                     <a:srgbClr val="000000"/>
                   </a:solidFill>
@@ -6690,7 +6690,7 @@
             </a:ln>
             <a:extLst>
               <a:ext uri="{91240B29-F687-4f45-9708-019B960494DF}">
-                <a14:hiddenLine xmlns:a14="http://schemas.microsoft.com/office/drawing/2010/main" xmlns="" w="9525">
+                <a14:hiddenLine xmlns="" xmlns:a14="http://schemas.microsoft.com/office/drawing/2010/main" w="9525">
                   <a:solidFill>
                     <a:srgbClr val="000000"/>
                   </a:solidFill>
@@ -6752,7 +6752,7 @@
             </a:ln>
             <a:extLst>
               <a:ext uri="{91240B29-F687-4f45-9708-019B960494DF}">
-                <a14:hiddenLine xmlns:a14="http://schemas.microsoft.com/office/drawing/2010/main" xmlns="" w="9525">
+                <a14:hiddenLine xmlns="" xmlns:a14="http://schemas.microsoft.com/office/drawing/2010/main" w="9525">
                   <a:solidFill>
                     <a:srgbClr val="000000"/>
                   </a:solidFill>
@@ -6842,7 +6842,7 @@
             </a:ln>
             <a:extLst>
               <a:ext uri="{91240B29-F687-4f45-9708-019B960494DF}">
-                <a14:hiddenLine xmlns:a14="http://schemas.microsoft.com/office/drawing/2010/main" xmlns="" w="9525">
+                <a14:hiddenLine xmlns="" xmlns:a14="http://schemas.microsoft.com/office/drawing/2010/main" w="9525">
                   <a:solidFill>
                     <a:srgbClr val="000000"/>
                   </a:solidFill>
@@ -6932,7 +6932,7 @@
             </a:ln>
             <a:extLst>
               <a:ext uri="{91240B29-F687-4f45-9708-019B960494DF}">
-                <a14:hiddenLine xmlns:a14="http://schemas.microsoft.com/office/drawing/2010/main" xmlns="" w="9525">
+                <a14:hiddenLine xmlns="" xmlns:a14="http://schemas.microsoft.com/office/drawing/2010/main" w="9525">
                   <a:solidFill>
                     <a:srgbClr val="000000"/>
                   </a:solidFill>
@@ -6997,7 +6997,7 @@
             </a:ln>
             <a:extLst>
               <a:ext uri="{91240B29-F687-4f45-9708-019B960494DF}">
-                <a14:hiddenLine xmlns:a14="http://schemas.microsoft.com/office/drawing/2010/main" xmlns="" w="9525">
+                <a14:hiddenLine xmlns="" xmlns:a14="http://schemas.microsoft.com/office/drawing/2010/main" w="9525">
                   <a:solidFill>
                     <a:srgbClr val="000000"/>
                   </a:solidFill>
@@ -7059,7 +7059,7 @@
             </a:ln>
             <a:extLst>
               <a:ext uri="{91240B29-F687-4f45-9708-019B960494DF}">
-                <a14:hiddenLine xmlns:a14="http://schemas.microsoft.com/office/drawing/2010/main" xmlns="" w="9525">
+                <a14:hiddenLine xmlns="" xmlns:a14="http://schemas.microsoft.com/office/drawing/2010/main" w="9525">
                   <a:solidFill>
                     <a:srgbClr val="000000"/>
                   </a:solidFill>
@@ -7149,7 +7149,7 @@
             </a:ln>
             <a:extLst>
               <a:ext uri="{91240B29-F687-4f45-9708-019B960494DF}">
-                <a14:hiddenLine xmlns:a14="http://schemas.microsoft.com/office/drawing/2010/main" xmlns="" w="9525">
+                <a14:hiddenLine xmlns="" xmlns:a14="http://schemas.microsoft.com/office/drawing/2010/main" w="9525">
                   <a:solidFill>
                     <a:srgbClr val="000000"/>
                   </a:solidFill>
@@ -7239,7 +7239,7 @@
             </a:ln>
             <a:extLst>
               <a:ext uri="{91240B29-F687-4f45-9708-019B960494DF}">
-                <a14:hiddenLine xmlns:a14="http://schemas.microsoft.com/office/drawing/2010/main" xmlns="" w="9525">
+                <a14:hiddenLine xmlns="" xmlns:a14="http://schemas.microsoft.com/office/drawing/2010/main" w="9525">
                   <a:solidFill>
                     <a:srgbClr val="000000"/>
                   </a:solidFill>
@@ -7301,7 +7301,7 @@
             </a:ln>
             <a:extLst>
               <a:ext uri="{91240B29-F687-4f45-9708-019B960494DF}">
-                <a14:hiddenLine xmlns:a14="http://schemas.microsoft.com/office/drawing/2010/main" xmlns="" w="9525">
+                <a14:hiddenLine xmlns="" xmlns:a14="http://schemas.microsoft.com/office/drawing/2010/main" w="9525">
                   <a:solidFill>
                     <a:srgbClr val="000000"/>
                   </a:solidFill>
@@ -7421,7 +7421,7 @@
             </a:ln>
             <a:extLst>
               <a:ext uri="{91240B29-F687-4f45-9708-019B960494DF}">
-                <a14:hiddenLine xmlns:a14="http://schemas.microsoft.com/office/drawing/2010/main" xmlns="" w="9525">
+                <a14:hiddenLine xmlns="" xmlns:a14="http://schemas.microsoft.com/office/drawing/2010/main" w="9525">
                   <a:solidFill>
                     <a:srgbClr val="000000"/>
                   </a:solidFill>
@@ -7489,7 +7489,7 @@
             </a:ln>
             <a:extLst>
               <a:ext uri="{91240B29-F687-4f45-9708-019B960494DF}">
-                <a14:hiddenLine xmlns:a14="http://schemas.microsoft.com/office/drawing/2010/main" xmlns="" w="9525">
+                <a14:hiddenLine xmlns="" xmlns:a14="http://schemas.microsoft.com/office/drawing/2010/main" w="9525">
                   <a:solidFill>
                     <a:srgbClr val="000000"/>
                   </a:solidFill>
@@ -7579,7 +7579,7 @@
             </a:ln>
             <a:extLst>
               <a:ext uri="{91240B29-F687-4f45-9708-019B960494DF}">
-                <a14:hiddenLine xmlns:a14="http://schemas.microsoft.com/office/drawing/2010/main" xmlns="" w="9525">
+                <a14:hiddenLine xmlns="" xmlns:a14="http://schemas.microsoft.com/office/drawing/2010/main" w="9525">
                   <a:solidFill>
                     <a:srgbClr val="000000"/>
                   </a:solidFill>
@@ -7719,7 +7719,7 @@
           <a:p>
             <a:fld id="{9AB3A824-1A51-4B26-AD58-A6D8E14F6C04}" type="datetimeFigureOut">
               <a:rPr lang="en-US" smtClean="0"/>
-              <a:t>3/26/20</a:t>
+              <a:t>4/1/20</a:t>
             </a:fld>
             <a:endParaRPr lang="en-US" dirty="0"/>
           </a:p>
@@ -7991,7 +7991,7 @@
           <a:p>
             <a:fld id="{3CBC1C18-307B-4F68-A007-B5B542270E8D}" type="datetimeFigureOut">
               <a:rPr lang="en-US" smtClean="0"/>
-              <a:t>3/26/20</a:t>
+              <a:t>4/1/20</a:t>
             </a:fld>
             <a:endParaRPr lang="en-US" dirty="0"/>
           </a:p>
@@ -8194,7 +8194,7 @@
           <a:p>
             <a:fld id="{3CBC1C18-307B-4F68-A007-B5B542270E8D}" type="datetimeFigureOut">
               <a:rPr lang="en-US" smtClean="0"/>
-              <a:t>3/26/20</a:t>
+              <a:t>4/1/20</a:t>
             </a:fld>
             <a:endParaRPr lang="en-US" dirty="0"/>
           </a:p>
@@ -8464,7 +8464,7 @@
           <a:p>
             <a:fld id="{3CBC1C18-307B-4F68-A007-B5B542270E8D}" type="datetimeFigureOut">
               <a:rPr lang="en-US" smtClean="0"/>
-              <a:t>3/26/20</a:t>
+              <a:t>4/1/20</a:t>
             </a:fld>
             <a:endParaRPr lang="en-US" dirty="0"/>
           </a:p>
@@ -8905,7 +8905,7 @@
           <a:p>
             <a:fld id="{3CBC1C18-307B-4F68-A007-B5B542270E8D}" type="datetimeFigureOut">
               <a:rPr lang="en-US" smtClean="0"/>
-              <a:t>3/26/20</a:t>
+              <a:t>4/1/20</a:t>
             </a:fld>
             <a:endParaRPr lang="en-US" dirty="0"/>
           </a:p>
@@ -9458,7 +9458,7 @@
           <a:p>
             <a:fld id="{3CBC1C18-307B-4F68-A007-B5B542270E8D}" type="datetimeFigureOut">
               <a:rPr lang="en-US" smtClean="0"/>
-              <a:t>3/26/20</a:t>
+              <a:t>4/1/20</a:t>
             </a:fld>
             <a:endParaRPr lang="en-US" dirty="0"/>
           </a:p>
@@ -10185,7 +10185,7 @@
           <a:p>
             <a:fld id="{3CBC1C18-307B-4F68-A007-B5B542270E8D}" type="datetimeFigureOut">
               <a:rPr lang="en-US" smtClean="0"/>
-              <a:t>3/26/20</a:t>
+              <a:t>4/1/20</a:t>
             </a:fld>
             <a:endParaRPr lang="en-US" dirty="0"/>
           </a:p>
@@ -10362,7 +10362,7 @@
           <a:p>
             <a:fld id="{D857E33E-8B18-4087-B112-809917729534}" type="datetimeFigureOut">
               <a:rPr lang="en-US" smtClean="0"/>
-              <a:t>3/26/20</a:t>
+              <a:t>4/1/20</a:t>
             </a:fld>
             <a:endParaRPr lang="en-US" dirty="0"/>
           </a:p>
@@ -10547,7 +10547,7 @@
           <a:p>
             <a:fld id="{D3FFE419-2371-464F-8239-3959401C3561}" type="datetimeFigureOut">
               <a:rPr lang="en-US" smtClean="0"/>
-              <a:t>3/26/20</a:t>
+              <a:t>4/1/20</a:t>
             </a:fld>
             <a:endParaRPr lang="en-US" dirty="0"/>
           </a:p>
@@ -10722,7 +10722,7 @@
           <a:p>
             <a:fld id="{97D162C4-EDD9-4389-A98B-B87ECEA2A816}" type="datetimeFigureOut">
               <a:rPr lang="en-US" smtClean="0"/>
-              <a:t>3/26/20</a:t>
+              <a:t>4/1/20</a:t>
             </a:fld>
             <a:endParaRPr lang="en-US" dirty="0"/>
           </a:p>
@@ -10977,7 +10977,7 @@
           <a:p>
             <a:fld id="{3E5059C3-6A89-4494-99FF-5A4D6FFD50EB}" type="datetimeFigureOut">
               <a:rPr lang="en-US" smtClean="0"/>
-              <a:t>3/26/20</a:t>
+              <a:t>4/1/20</a:t>
             </a:fld>
             <a:endParaRPr lang="en-US" dirty="0"/>
           </a:p>
@@ -11214,7 +11214,7 @@
           <a:p>
             <a:fld id="{CA954B2F-12DE-47F5-8894-472B206D2E1E}" type="datetimeFigureOut">
               <a:rPr lang="en-US" smtClean="0"/>
-              <a:t>3/26/20</a:t>
+              <a:t>4/1/20</a:t>
             </a:fld>
             <a:endParaRPr lang="en-US" dirty="0"/>
           </a:p>
@@ -11600,7 +11600,7 @@
           <a:p>
             <a:fld id="{3CBC1C18-307B-4F68-A007-B5B542270E8D}" type="datetimeFigureOut">
               <a:rPr lang="en-US" smtClean="0"/>
-              <a:t>3/26/20</a:t>
+              <a:t>4/1/20</a:t>
             </a:fld>
             <a:endParaRPr lang="en-US" dirty="0"/>
           </a:p>
@@ -11725,7 +11725,7 @@
           <a:p>
             <a:fld id="{1FAF3416-4057-4DAA-829D-4CA07428D088}" type="datetimeFigureOut">
               <a:rPr lang="en-US" smtClean="0"/>
-              <a:t>3/26/20</a:t>
+              <a:t>4/1/20</a:t>
             </a:fld>
             <a:endParaRPr lang="en-US" dirty="0"/>
           </a:p>
@@ -11825,7 +11825,7 @@
           <a:p>
             <a:fld id="{921D9284-D300-4297-87F7-E791DCC15DB1}" type="datetimeFigureOut">
               <a:rPr lang="en-US" smtClean="0"/>
-              <a:t>3/26/20</a:t>
+              <a:t>4/1/20</a:t>
             </a:fld>
             <a:endParaRPr lang="en-US" dirty="0"/>
           </a:p>
@@ -12079,7 +12079,7 @@
           <a:p>
             <a:fld id="{37D525BB-DA17-4BA0-B3C8-3AC3ABC827E6}" type="datetimeFigureOut">
               <a:rPr lang="en-US" smtClean="0"/>
-              <a:t>3/26/20</a:t>
+              <a:t>4/1/20</a:t>
             </a:fld>
             <a:endParaRPr lang="en-US" dirty="0"/>
           </a:p>
@@ -12364,7 +12364,7 @@
           <a:p>
             <a:fld id="{B16C4C9A-3960-41CF-A4E9-2A8FB932454B}" type="datetimeFigureOut">
               <a:rPr lang="en-US" smtClean="0"/>
-              <a:t>3/26/20</a:t>
+              <a:t>4/1/20</a:t>
             </a:fld>
             <a:endParaRPr lang="en-US" dirty="0"/>
           </a:p>
@@ -12485,7 +12485,7 @@
           <a:noFill/>
           <a:extLst>
             <a:ext uri="{909E8E84-426E-40dd-AFC4-6F175D3DCCD1}">
-              <a14:hiddenFill xmlns:a14="http://schemas.microsoft.com/office/drawing/2010/main" xmlns="">
+              <a14:hiddenFill xmlns="" xmlns:a14="http://schemas.microsoft.com/office/drawing/2010/main">
                 <a:solidFill>
                   <a:srgbClr val="FFFFFF"/>
                 </a:solidFill>
@@ -12559,7 +12559,7 @@
               </a:ln>
               <a:extLst>
                 <a:ext uri="{91240B29-F687-4f45-9708-019B960494DF}">
-                  <a14:hiddenLine xmlns:a14="http://schemas.microsoft.com/office/drawing/2010/main" xmlns="" w="9525">
+                  <a14:hiddenLine xmlns="" xmlns:a14="http://schemas.microsoft.com/office/drawing/2010/main" w="9525">
                     <a:solidFill>
                       <a:srgbClr val="000000"/>
                     </a:solidFill>
@@ -12649,7 +12649,7 @@
               </a:ln>
               <a:extLst>
                 <a:ext uri="{91240B29-F687-4f45-9708-019B960494DF}">
-                  <a14:hiddenLine xmlns:a14="http://schemas.microsoft.com/office/drawing/2010/main" xmlns="" w="9525">
+                  <a14:hiddenLine xmlns="" xmlns:a14="http://schemas.microsoft.com/office/drawing/2010/main" w="9525">
                     <a:solidFill>
                       <a:srgbClr val="000000"/>
                     </a:solidFill>
@@ -12739,7 +12739,7 @@
               </a:ln>
               <a:extLst>
                 <a:ext uri="{91240B29-F687-4f45-9708-019B960494DF}">
-                  <a14:hiddenLine xmlns:a14="http://schemas.microsoft.com/office/drawing/2010/main" xmlns="" w="9525">
+                  <a14:hiddenLine xmlns="" xmlns:a14="http://schemas.microsoft.com/office/drawing/2010/main" w="9525">
                     <a:solidFill>
                       <a:srgbClr val="000000"/>
                     </a:solidFill>
@@ -12801,7 +12801,7 @@
               </a:ln>
               <a:extLst>
                 <a:ext uri="{91240B29-F687-4f45-9708-019B960494DF}">
-                  <a14:hiddenLine xmlns:a14="http://schemas.microsoft.com/office/drawing/2010/main" xmlns="" w="9525">
+                  <a14:hiddenLine xmlns="" xmlns:a14="http://schemas.microsoft.com/office/drawing/2010/main" w="9525">
                     <a:solidFill>
                       <a:srgbClr val="000000"/>
                     </a:solidFill>
@@ -12891,7 +12891,7 @@
               </a:ln>
               <a:extLst>
                 <a:ext uri="{91240B29-F687-4f45-9708-019B960494DF}">
-                  <a14:hiddenLine xmlns:a14="http://schemas.microsoft.com/office/drawing/2010/main" xmlns="" w="9525">
+                  <a14:hiddenLine xmlns="" xmlns:a14="http://schemas.microsoft.com/office/drawing/2010/main" w="9525">
                     <a:solidFill>
                       <a:srgbClr val="000000"/>
                     </a:solidFill>
@@ -12953,7 +12953,7 @@
               </a:ln>
               <a:extLst>
                 <a:ext uri="{91240B29-F687-4f45-9708-019B960494DF}">
-                  <a14:hiddenLine xmlns:a14="http://schemas.microsoft.com/office/drawing/2010/main" xmlns="" w="9525">
+                  <a14:hiddenLine xmlns="" xmlns:a14="http://schemas.microsoft.com/office/drawing/2010/main" w="9525">
                     <a:solidFill>
                       <a:srgbClr val="000000"/>
                     </a:solidFill>
@@ -13015,7 +13015,7 @@
               </a:ln>
               <a:extLst>
                 <a:ext uri="{91240B29-F687-4f45-9708-019B960494DF}">
-                  <a14:hiddenLine xmlns:a14="http://schemas.microsoft.com/office/drawing/2010/main" xmlns="" w="9525">
+                  <a14:hiddenLine xmlns="" xmlns:a14="http://schemas.microsoft.com/office/drawing/2010/main" w="9525">
                     <a:solidFill>
                       <a:srgbClr val="000000"/>
                     </a:solidFill>
@@ -13105,7 +13105,7 @@
               </a:ln>
               <a:extLst>
                 <a:ext uri="{91240B29-F687-4f45-9708-019B960494DF}">
-                  <a14:hiddenLine xmlns:a14="http://schemas.microsoft.com/office/drawing/2010/main" xmlns="" w="9525">
+                  <a14:hiddenLine xmlns="" xmlns:a14="http://schemas.microsoft.com/office/drawing/2010/main" w="9525">
                     <a:solidFill>
                       <a:srgbClr val="000000"/>
                     </a:solidFill>
@@ -13195,7 +13195,7 @@
               </a:ln>
               <a:extLst>
                 <a:ext uri="{91240B29-F687-4f45-9708-019B960494DF}">
-                  <a14:hiddenLine xmlns:a14="http://schemas.microsoft.com/office/drawing/2010/main" xmlns="" w="9525">
+                  <a14:hiddenLine xmlns="" xmlns:a14="http://schemas.microsoft.com/office/drawing/2010/main" w="9525">
                     <a:solidFill>
                       <a:srgbClr val="000000"/>
                     </a:solidFill>
@@ -13257,7 +13257,7 @@
               </a:ln>
               <a:extLst>
                 <a:ext uri="{91240B29-F687-4f45-9708-019B960494DF}">
-                  <a14:hiddenLine xmlns:a14="http://schemas.microsoft.com/office/drawing/2010/main" xmlns="" w="9525">
+                  <a14:hiddenLine xmlns="" xmlns:a14="http://schemas.microsoft.com/office/drawing/2010/main" w="9525">
                     <a:solidFill>
                       <a:srgbClr val="000000"/>
                     </a:solidFill>
@@ -13367,7 +13367,7 @@
               </a:ln>
               <a:extLst>
                 <a:ext uri="{91240B29-F687-4f45-9708-019B960494DF}">
-                  <a14:hiddenLine xmlns:a14="http://schemas.microsoft.com/office/drawing/2010/main" xmlns="" w="9525">
+                  <a14:hiddenLine xmlns="" xmlns:a14="http://schemas.microsoft.com/office/drawing/2010/main" w="9525">
                     <a:solidFill>
                       <a:srgbClr val="000000"/>
                     </a:solidFill>
@@ -13451,7 +13451,7 @@
               </a:ln>
               <a:extLst>
                 <a:ext uri="{91240B29-F687-4f45-9708-019B960494DF}">
-                  <a14:hiddenLine xmlns:a14="http://schemas.microsoft.com/office/drawing/2010/main" xmlns="" w="9525">
+                  <a14:hiddenLine xmlns="" xmlns:a14="http://schemas.microsoft.com/office/drawing/2010/main" w="9525">
                     <a:solidFill>
                       <a:srgbClr val="000000"/>
                     </a:solidFill>
@@ -13513,7 +13513,7 @@
               </a:ln>
               <a:extLst>
                 <a:ext uri="{91240B29-F687-4f45-9708-019B960494DF}">
-                  <a14:hiddenLine xmlns:a14="http://schemas.microsoft.com/office/drawing/2010/main" xmlns="" w="9525">
+                  <a14:hiddenLine xmlns="" xmlns:a14="http://schemas.microsoft.com/office/drawing/2010/main" w="9525">
                     <a:solidFill>
                       <a:srgbClr val="000000"/>
                     </a:solidFill>
@@ -13575,7 +13575,7 @@
               </a:ln>
               <a:extLst>
                 <a:ext uri="{91240B29-F687-4f45-9708-019B960494DF}">
-                  <a14:hiddenLine xmlns:a14="http://schemas.microsoft.com/office/drawing/2010/main" xmlns="" w="9525">
+                  <a14:hiddenLine xmlns="" xmlns:a14="http://schemas.microsoft.com/office/drawing/2010/main" w="9525">
                     <a:solidFill>
                       <a:srgbClr val="000000"/>
                     </a:solidFill>
@@ -13665,7 +13665,7 @@
               </a:ln>
               <a:extLst>
                 <a:ext uri="{91240B29-F687-4f45-9708-019B960494DF}">
-                  <a14:hiddenLine xmlns:a14="http://schemas.microsoft.com/office/drawing/2010/main" xmlns="" w="9525">
+                  <a14:hiddenLine xmlns="" xmlns:a14="http://schemas.microsoft.com/office/drawing/2010/main" w="9525">
                     <a:solidFill>
                       <a:srgbClr val="000000"/>
                     </a:solidFill>
@@ -13699,7 +13699,7 @@
               </a:ln>
               <a:extLst>
                 <a:ext uri="{91240B29-F687-4f45-9708-019B960494DF}">
-                  <a14:hiddenLine xmlns:a14="http://schemas.microsoft.com/office/drawing/2010/main" xmlns="" w="9525">
+                  <a14:hiddenLine xmlns="" xmlns:a14="http://schemas.microsoft.com/office/drawing/2010/main" w="9525">
                     <a:solidFill>
                       <a:srgbClr val="000000"/>
                     </a:solidFill>
@@ -13764,7 +13764,7 @@
               </a:ln>
               <a:extLst>
                 <a:ext uri="{91240B29-F687-4f45-9708-019B960494DF}">
-                  <a14:hiddenLine xmlns:a14="http://schemas.microsoft.com/office/drawing/2010/main" xmlns="" w="9525">
+                  <a14:hiddenLine xmlns="" xmlns:a14="http://schemas.microsoft.com/office/drawing/2010/main" w="9525">
                     <a:solidFill>
                       <a:srgbClr val="000000"/>
                     </a:solidFill>
@@ -13854,7 +13854,7 @@
               </a:ln>
               <a:extLst>
                 <a:ext uri="{91240B29-F687-4f45-9708-019B960494DF}">
-                  <a14:hiddenLine xmlns:a14="http://schemas.microsoft.com/office/drawing/2010/main" xmlns="" w="9525">
+                  <a14:hiddenLine xmlns="" xmlns:a14="http://schemas.microsoft.com/office/drawing/2010/main" w="9525">
                     <a:solidFill>
                       <a:srgbClr val="000000"/>
                     </a:solidFill>
@@ -13916,7 +13916,7 @@
               </a:ln>
               <a:extLst>
                 <a:ext uri="{91240B29-F687-4f45-9708-019B960494DF}">
-                  <a14:hiddenLine xmlns:a14="http://schemas.microsoft.com/office/drawing/2010/main" xmlns="" w="9525">
+                  <a14:hiddenLine xmlns="" xmlns:a14="http://schemas.microsoft.com/office/drawing/2010/main" w="9525">
                     <a:solidFill>
                       <a:srgbClr val="000000"/>
                     </a:solidFill>
@@ -14006,7 +14006,7 @@
               </a:ln>
               <a:extLst>
                 <a:ext uri="{91240B29-F687-4f45-9708-019B960494DF}">
-                  <a14:hiddenLine xmlns:a14="http://schemas.microsoft.com/office/drawing/2010/main" xmlns="" w="9525">
+                  <a14:hiddenLine xmlns="" xmlns:a14="http://schemas.microsoft.com/office/drawing/2010/main" w="9525">
                     <a:solidFill>
                       <a:srgbClr val="000000"/>
                     </a:solidFill>
@@ -14071,7 +14071,7 @@
               </a:ln>
               <a:extLst>
                 <a:ext uri="{91240B29-F687-4f45-9708-019B960494DF}">
-                  <a14:hiddenLine xmlns:a14="http://schemas.microsoft.com/office/drawing/2010/main" xmlns="" w="9525">
+                  <a14:hiddenLine xmlns="" xmlns:a14="http://schemas.microsoft.com/office/drawing/2010/main" w="9525">
                     <a:solidFill>
                       <a:srgbClr val="000000"/>
                     </a:solidFill>
@@ -14133,7 +14133,7 @@
               </a:ln>
               <a:extLst>
                 <a:ext uri="{91240B29-F687-4f45-9708-019B960494DF}">
-                  <a14:hiddenLine xmlns:a14="http://schemas.microsoft.com/office/drawing/2010/main" xmlns="" w="9525">
+                  <a14:hiddenLine xmlns="" xmlns:a14="http://schemas.microsoft.com/office/drawing/2010/main" w="9525">
                     <a:solidFill>
                       <a:srgbClr val="000000"/>
                     </a:solidFill>
@@ -14223,7 +14223,7 @@
               </a:ln>
               <a:extLst>
                 <a:ext uri="{91240B29-F687-4f45-9708-019B960494DF}">
-                  <a14:hiddenLine xmlns:a14="http://schemas.microsoft.com/office/drawing/2010/main" xmlns="" w="9525">
+                  <a14:hiddenLine xmlns="" xmlns:a14="http://schemas.microsoft.com/office/drawing/2010/main" w="9525">
                     <a:solidFill>
                       <a:srgbClr val="000000"/>
                     </a:solidFill>
@@ -14313,7 +14313,7 @@
               </a:ln>
               <a:extLst>
                 <a:ext uri="{91240B29-F687-4f45-9708-019B960494DF}">
-                  <a14:hiddenLine xmlns:a14="http://schemas.microsoft.com/office/drawing/2010/main" xmlns="" w="9525">
+                  <a14:hiddenLine xmlns="" xmlns:a14="http://schemas.microsoft.com/office/drawing/2010/main" w="9525">
                     <a:solidFill>
                       <a:srgbClr val="000000"/>
                     </a:solidFill>
@@ -14378,7 +14378,7 @@
               </a:ln>
               <a:extLst>
                 <a:ext uri="{91240B29-F687-4f45-9708-019B960494DF}">
-                  <a14:hiddenLine xmlns:a14="http://schemas.microsoft.com/office/drawing/2010/main" xmlns="" w="9525">
+                  <a14:hiddenLine xmlns="" xmlns:a14="http://schemas.microsoft.com/office/drawing/2010/main" w="9525">
                     <a:solidFill>
                       <a:srgbClr val="000000"/>
                     </a:solidFill>
@@ -14498,7 +14498,7 @@
               </a:ln>
               <a:extLst>
                 <a:ext uri="{91240B29-F687-4f45-9708-019B960494DF}">
-                  <a14:hiddenLine xmlns:a14="http://schemas.microsoft.com/office/drawing/2010/main" xmlns="" w="9525">
+                  <a14:hiddenLine xmlns="" xmlns:a14="http://schemas.microsoft.com/office/drawing/2010/main" w="9525">
                     <a:solidFill>
                       <a:srgbClr val="000000"/>
                     </a:solidFill>
@@ -14596,7 +14596,7 @@
               </a:ln>
               <a:extLst>
                 <a:ext uri="{91240B29-F687-4f45-9708-019B960494DF}">
-                  <a14:hiddenLine xmlns:a14="http://schemas.microsoft.com/office/drawing/2010/main" xmlns="" w="9525">
+                  <a14:hiddenLine xmlns="" xmlns:a14="http://schemas.microsoft.com/office/drawing/2010/main" w="9525">
                     <a:solidFill>
                       <a:srgbClr val="000000"/>
                     </a:solidFill>
@@ -14711,7 +14711,7 @@
               </a:ln>
               <a:extLst>
                 <a:ext uri="{91240B29-F687-4f45-9708-019B960494DF}">
-                  <a14:hiddenLine xmlns:a14="http://schemas.microsoft.com/office/drawing/2010/main" xmlns="" w="9525">
+                  <a14:hiddenLine xmlns="" xmlns:a14="http://schemas.microsoft.com/office/drawing/2010/main" w="9525">
                     <a:solidFill>
                       <a:srgbClr val="000000"/>
                     </a:solidFill>
@@ -14801,7 +14801,7 @@
               </a:ln>
               <a:extLst>
                 <a:ext uri="{91240B29-F687-4f45-9708-019B960494DF}">
-                  <a14:hiddenLine xmlns:a14="http://schemas.microsoft.com/office/drawing/2010/main" xmlns="" w="9525">
+                  <a14:hiddenLine xmlns="" xmlns:a14="http://schemas.microsoft.com/office/drawing/2010/main" w="9525">
                     <a:solidFill>
                       <a:srgbClr val="000000"/>
                     </a:solidFill>
@@ -14866,7 +14866,7 @@
               </a:ln>
               <a:extLst>
                 <a:ext uri="{91240B29-F687-4f45-9708-019B960494DF}">
-                  <a14:hiddenLine xmlns:a14="http://schemas.microsoft.com/office/drawing/2010/main" xmlns="" w="9525">
+                  <a14:hiddenLine xmlns="" xmlns:a14="http://schemas.microsoft.com/office/drawing/2010/main" w="9525">
                     <a:solidFill>
                       <a:srgbClr val="000000"/>
                     </a:solidFill>
@@ -14956,7 +14956,7 @@
               </a:ln>
               <a:extLst>
                 <a:ext uri="{91240B29-F687-4f45-9708-019B960494DF}">
-                  <a14:hiddenLine xmlns:a14="http://schemas.microsoft.com/office/drawing/2010/main" xmlns="" w="9525">
+                  <a14:hiddenLine xmlns="" xmlns:a14="http://schemas.microsoft.com/office/drawing/2010/main" w="9525">
                     <a:solidFill>
                       <a:srgbClr val="000000"/>
                     </a:solidFill>
@@ -15024,7 +15024,7 @@
               </a:ln>
               <a:extLst>
                 <a:ext uri="{91240B29-F687-4f45-9708-019B960494DF}">
-                  <a14:hiddenLine xmlns:a14="http://schemas.microsoft.com/office/drawing/2010/main" xmlns="" w="9525">
+                  <a14:hiddenLine xmlns="" xmlns:a14="http://schemas.microsoft.com/office/drawing/2010/main" w="9525">
                     <a:solidFill>
                       <a:srgbClr val="000000"/>
                     </a:solidFill>
@@ -15114,7 +15114,7 @@
               </a:ln>
               <a:extLst>
                 <a:ext uri="{91240B29-F687-4f45-9708-019B960494DF}">
-                  <a14:hiddenLine xmlns:a14="http://schemas.microsoft.com/office/drawing/2010/main" xmlns="" w="9525">
+                  <a14:hiddenLine xmlns="" xmlns:a14="http://schemas.microsoft.com/office/drawing/2010/main" w="9525">
                     <a:solidFill>
                       <a:srgbClr val="000000"/>
                     </a:solidFill>
@@ -15182,7 +15182,7 @@
               </a:ln>
               <a:extLst>
                 <a:ext uri="{91240B29-F687-4f45-9708-019B960494DF}">
-                  <a14:hiddenLine xmlns:a14="http://schemas.microsoft.com/office/drawing/2010/main" xmlns="" w="9525">
+                  <a14:hiddenLine xmlns="" xmlns:a14="http://schemas.microsoft.com/office/drawing/2010/main" w="9525">
                     <a:solidFill>
                       <a:srgbClr val="000000"/>
                     </a:solidFill>
@@ -15272,7 +15272,7 @@
               </a:ln>
               <a:extLst>
                 <a:ext uri="{91240B29-F687-4f45-9708-019B960494DF}">
-                  <a14:hiddenLine xmlns:a14="http://schemas.microsoft.com/office/drawing/2010/main" xmlns="" w="9525">
+                  <a14:hiddenLine xmlns="" xmlns:a14="http://schemas.microsoft.com/office/drawing/2010/main" w="9525">
                     <a:solidFill>
                       <a:srgbClr val="000000"/>
                     </a:solidFill>
@@ -15306,7 +15306,7 @@
               </a:ln>
               <a:extLst>
                 <a:ext uri="{91240B29-F687-4f45-9708-019B960494DF}">
-                  <a14:hiddenLine xmlns:a14="http://schemas.microsoft.com/office/drawing/2010/main" xmlns="" w="9525">
+                  <a14:hiddenLine xmlns="" xmlns:a14="http://schemas.microsoft.com/office/drawing/2010/main" w="9525">
                     <a:solidFill>
                       <a:srgbClr val="000000"/>
                     </a:solidFill>
@@ -15446,7 +15446,7 @@
           <a:p>
             <a:fld id="{3CBC1C18-307B-4F68-A007-B5B542270E8D}" type="datetimeFigureOut">
               <a:rPr lang="en-US" smtClean="0"/>
-              <a:t>3/26/20</a:t>
+              <a:t>4/1/20</a:t>
             </a:fld>
             <a:endParaRPr lang="en-US" dirty="0"/>
           </a:p>
@@ -18068,6 +18068,10 @@
           </a:p>
           <a:p>
             <a:r>
+              <a:rPr lang="de-DE"/>
+              <a:t>Log4j</a:t>
+            </a:r>
+            <a:r>
               <a:rPr lang="de-DE" dirty="0"/>
               <a:t>	</a:t>
             </a:r>

</xml_diff>

<commit_message>
Endgültige Version der PowerPoint Präsentation.
Former-commit-id: b861c61e83376a6f79e5f189f4107d0cff604458
</commit_message>
<xml_diff>
--- a/documents/Meilensteine/Meilenstein III/Meilenstein_3_Präsentation .pptx
+++ b/documents/Meilensteine/Meilenstein III/Meilenstein_3_Präsentation .pptx
@@ -15972,7 +15972,7 @@
       </p:sp>
       <p:sp>
         <p:nvSpPr>
-          <p:cNvPr id="11" name="Round Diagonal Corner Rectangle 6">
+          <p:cNvPr id="16" name="Round Diagonal Corner Rectangle 6">
             <a:extLst>
               <a:ext uri="{FF2B5EF4-FFF2-40B4-BE49-F238E27FC236}">
                 <a16:creationId xmlns:a16="http://schemas.microsoft.com/office/drawing/2014/main" id="{01958E0A-0BC1-424F-9B41-D614FC13A47E}"/>
@@ -16052,10 +16052,10 @@
       </p:sp>
       <p:pic>
         <p:nvPicPr>
-          <p:cNvPr id="6" name="Grafik 5">
+          <p:cNvPr id="7" name="Grafik 6">
             <a:extLst>
               <a:ext uri="{FF2B5EF4-FFF2-40B4-BE49-F238E27FC236}">
-                <a16:creationId xmlns:a16="http://schemas.microsoft.com/office/drawing/2014/main" id="{88197019-F277-C142-9294-0785525AFAB4}"/>
+                <a16:creationId xmlns:a16="http://schemas.microsoft.com/office/drawing/2014/main" id="{F1CC6755-1F6E-CF40-A544-06C0569AFA80}"/>
               </a:ext>
             </a:extLst>
           </p:cNvPr>
@@ -16066,13 +16066,13 @@
         </p:nvPicPr>
         <p:blipFill rotWithShape="1">
           <a:blip r:embed="rId3"/>
-          <a:srcRect t="1257"/>
+          <a:srcRect t="7922" r="1" b="1"/>
           <a:stretch/>
         </p:blipFill>
         <p:spPr>
           <a:xfrm>
-            <a:off x="6255029" y="972331"/>
-            <a:ext cx="4968316" cy="4905846"/>
+            <a:off x="6421396" y="1113282"/>
+            <a:ext cx="4635583" cy="4600621"/>
           </a:xfrm>
           <a:prstGeom prst="rect">
             <a:avLst/>
@@ -16862,7 +16862,12 @@
             <p:ph type="title"/>
           </p:nvPr>
         </p:nvSpPr>
-        <p:spPr/>
+        <p:spPr>
+          <a:xfrm>
+            <a:off x="1141413" y="618518"/>
+            <a:ext cx="9905998" cy="1146782"/>
+          </a:xfrm>
+        </p:spPr>
         <p:txBody>
           <a:bodyPr/>
           <a:lstStyle/>
@@ -16893,7 +16898,7 @@
         </p:nvSpPr>
         <p:spPr>
           <a:xfrm>
-            <a:off x="1141412" y="2249486"/>
+            <a:off x="1141412" y="1765300"/>
             <a:ext cx="9905999" cy="3989995"/>
           </a:xfrm>
         </p:spPr>
@@ -17175,7 +17180,7 @@
         </p:nvSpPr>
         <p:spPr>
           <a:xfrm>
-            <a:off x="1141412" y="2249487"/>
+            <a:off x="1141412" y="1881187"/>
             <a:ext cx="9905999" cy="4230826"/>
           </a:xfrm>
         </p:spPr>
@@ -22147,80 +22152,87 @@
             <p:ph idx="1"/>
           </p:nvPr>
         </p:nvSpPr>
-        <p:spPr/>
+        <p:spPr>
+          <a:xfrm>
+            <a:off x="1141412" y="2249486"/>
+            <a:ext cx="9905999" cy="4252913"/>
+          </a:xfrm>
+        </p:spPr>
         <p:txBody>
-          <a:bodyPr/>
+          <a:bodyPr>
+            <a:normAutofit/>
+          </a:bodyPr>
           <a:lstStyle/>
           <a:p>
+            <a:r>
+              <a:rPr lang="de-CH" sz="2000" dirty="0">
+                <a:latin typeface="Calibri Light" panose="020F0302020204030204" pitchFamily="34" charset="0"/>
+                <a:cs typeface="Calibri Light" panose="020F0302020204030204" pitchFamily="34" charset="0"/>
+              </a:rPr>
+              <a:t>Befehle der Chats enthalten Sender-Client, Empfänger- Client und Nachricht</a:t>
+            </a:r>
+          </a:p>
+          <a:p>
+            <a:pPr lvl="1"/>
             <a:r>
               <a:rPr lang="de-CH" sz="1800" dirty="0">
                 <a:latin typeface="Calibri Light" panose="020F0302020204030204" pitchFamily="34" charset="0"/>
                 <a:cs typeface="Calibri Light" panose="020F0302020204030204" pitchFamily="34" charset="0"/>
               </a:rPr>
-              <a:t>Befehle der Chats enthalten Sender-Client, Empfänger- Client und Nachricht</a:t>
+              <a:t>Server/Serverhandler als Vermittler</a:t>
             </a:r>
           </a:p>
           <a:p>
             <a:pPr lvl="1"/>
+            <a:r>
+              <a:rPr lang="de-CH" sz="1800" dirty="0">
+                <a:latin typeface="Calibri Light" panose="020F0302020204030204" pitchFamily="34" charset="0"/>
+                <a:cs typeface="Calibri Light" panose="020F0302020204030204" pitchFamily="34" charset="0"/>
+              </a:rPr>
+              <a:t>Main Chat:</a:t>
+            </a:r>
+          </a:p>
+          <a:p>
+            <a:pPr lvl="2"/>
             <a:r>
               <a:rPr lang="de-CH" sz="1600" dirty="0">
                 <a:latin typeface="Calibri Light" panose="020F0302020204030204" pitchFamily="34" charset="0"/>
                 <a:cs typeface="Calibri Light" panose="020F0302020204030204" pitchFamily="34" charset="0"/>
               </a:rPr>
-              <a:t>Server/Serverhandler als Vermittler</a:t>
+              <a:t>Client schickt Befehl für jeden Client in der Userliste</a:t>
             </a:r>
           </a:p>
           <a:p>
             <a:pPr lvl="1"/>
+            <a:r>
+              <a:rPr lang="de-CH" sz="1800" dirty="0">
+                <a:latin typeface="Calibri Light" panose="020F0302020204030204" pitchFamily="34" charset="0"/>
+                <a:cs typeface="Calibri Light" panose="020F0302020204030204" pitchFamily="34" charset="0"/>
+              </a:rPr>
+              <a:t>Lobby Chat:</a:t>
+            </a:r>
+          </a:p>
+          <a:p>
+            <a:pPr lvl="2"/>
             <a:r>
               <a:rPr lang="de-CH" sz="1600" dirty="0">
                 <a:latin typeface="Calibri Light" panose="020F0302020204030204" pitchFamily="34" charset="0"/>
                 <a:cs typeface="Calibri Light" panose="020F0302020204030204" pitchFamily="34" charset="0"/>
               </a:rPr>
-              <a:t>Main Chat:</a:t>
-            </a:r>
-          </a:p>
-          <a:p>
-            <a:pPr lvl="2"/>
-            <a:r>
-              <a:rPr lang="de-CH" sz="1400" dirty="0">
-                <a:latin typeface="Calibri Light" panose="020F0302020204030204" pitchFamily="34" charset="0"/>
-                <a:cs typeface="Calibri Light" panose="020F0302020204030204" pitchFamily="34" charset="0"/>
-              </a:rPr>
-              <a:t>Client schickt Befehl für jeden Client in der Userliste</a:t>
+              <a:t>Client schickt Befehl für jeden Client in der Lobbyliste</a:t>
             </a:r>
           </a:p>
           <a:p>
             <a:pPr lvl="1"/>
             <a:r>
-              <a:rPr lang="de-CH" sz="1600" dirty="0">
-                <a:latin typeface="Calibri Light" panose="020F0302020204030204" pitchFamily="34" charset="0"/>
-                <a:cs typeface="Calibri Light" panose="020F0302020204030204" pitchFamily="34" charset="0"/>
-              </a:rPr>
-              <a:t>Lobby Chat:</a:t>
-            </a:r>
-          </a:p>
-          <a:p>
-            <a:pPr lvl="2"/>
-            <a:r>
-              <a:rPr lang="de-CH" sz="1400" dirty="0">
-                <a:latin typeface="Calibri Light" panose="020F0302020204030204" pitchFamily="34" charset="0"/>
-                <a:cs typeface="Calibri Light" panose="020F0302020204030204" pitchFamily="34" charset="0"/>
-              </a:rPr>
-              <a:t>Client schickt Befehl für jeden Client in der Lobbyliste</a:t>
-            </a:r>
-          </a:p>
-          <a:p>
-            <a:pPr lvl="1"/>
-            <a:r>
-              <a:rPr lang="de-CH" sz="1600" dirty="0" err="1">
+              <a:rPr lang="de-CH" sz="1800" dirty="0" err="1">
                 <a:latin typeface="Calibri Light" panose="020F0302020204030204" pitchFamily="34" charset="0"/>
                 <a:cs typeface="Calibri Light" panose="020F0302020204030204" pitchFamily="34" charset="0"/>
               </a:rPr>
               <a:t>Whisper</a:t>
             </a:r>
             <a:r>
-              <a:rPr lang="de-CH" sz="1600" dirty="0">
+              <a:rPr lang="de-CH" sz="1800" dirty="0">
                 <a:latin typeface="Calibri Light" panose="020F0302020204030204" pitchFamily="34" charset="0"/>
                 <a:cs typeface="Calibri Light" panose="020F0302020204030204" pitchFamily="34" charset="0"/>
               </a:rPr>
@@ -22230,14 +22242,14 @@
           <a:p>
             <a:pPr lvl="2"/>
             <a:r>
-              <a:rPr lang="de-CH" dirty="0">
+              <a:rPr lang="de-CH" sz="2000" dirty="0">
                 <a:latin typeface="Calibri Light" panose="020F0302020204030204" pitchFamily="34" charset="0"/>
                 <a:cs typeface="Calibri Light" panose="020F0302020204030204" pitchFamily="34" charset="0"/>
               </a:rPr>
               <a:t>Client</a:t>
             </a:r>
             <a:r>
-              <a:rPr lang="de-CH" sz="1400" dirty="0">
+              <a:rPr lang="de-CH" sz="1600" dirty="0">
                 <a:latin typeface="Calibri Light" panose="020F0302020204030204" pitchFamily="34" charset="0"/>
                 <a:cs typeface="Calibri Light" panose="020F0302020204030204" pitchFamily="34" charset="0"/>
               </a:rPr>
@@ -22245,7 +22257,7 @@
             </a:r>
           </a:p>
           <a:p>
-            <a:endParaRPr lang="de-DE" dirty="0"/>
+            <a:endParaRPr lang="de-DE" sz="2800" dirty="0"/>
           </a:p>
         </p:txBody>
       </p:sp>

</xml_diff>